<commit_message>
cleaned and refactored code
</commit_message>
<xml_diff>
--- a/docs/Ericsson Internship Project - Code Review 1.pptx
+++ b/docs/Ericsson Internship Project - Code Review 1.pptx
@@ -8864,144 +8864,21 @@
             <p:ph type="title"/>
           </p:nvPr>
         </p:nvSpPr>
-        <p:spPr/>
+        <p:spPr>
+          <a:xfrm>
+            <a:off x="1919668" y="348014"/>
+            <a:ext cx="8911687" cy="1280890"/>
+          </a:xfrm>
+        </p:spPr>
         <p:txBody>
           <a:bodyPr/>
           <a:lstStyle/>
           <a:p>
+            <a:pPr algn="ctr"/>
             <a:r>
               <a:rPr lang="en-IE" dirty="0"/>
-              <a:t>Requirements for Sprint 0</a:t>
-            </a:r>
-          </a:p>
-        </p:txBody>
-      </p:sp>
-      <p:sp>
-        <p:nvSpPr>
-          <p:cNvPr id="3" name="Content Placeholder 2">
-            <a:extLst>
-              <a:ext uri="{FF2B5EF4-FFF2-40B4-BE49-F238E27FC236}">
-                <a16:creationId xmlns:a16="http://schemas.microsoft.com/office/drawing/2014/main" id="{B768EE1E-4F4D-40D5-9624-24584B762541}"/>
-              </a:ext>
-            </a:extLst>
-          </p:cNvPr>
-          <p:cNvSpPr>
-            <a:spLocks noGrp="1"/>
-          </p:cNvSpPr>
-          <p:nvPr>
-            <p:ph idx="1"/>
-          </p:nvPr>
-        </p:nvSpPr>
-        <p:spPr>
-          <a:xfrm>
-            <a:off x="1632226" y="1245704"/>
-            <a:ext cx="10559774" cy="4988186"/>
-          </a:xfrm>
-        </p:spPr>
-        <p:txBody>
-          <a:bodyPr>
-            <a:normAutofit lnSpcReduction="10000"/>
-          </a:bodyPr>
-          <a:lstStyle/>
-          <a:p>
-            <a:r>
-              <a:rPr lang="en-IE" b="1" dirty="0"/>
-              <a:t>User Story</a:t>
-            </a:r>
-          </a:p>
-          <a:p>
-            <a:pPr lvl="1"/>
-            <a:r>
-              <a:rPr lang="en-IE" dirty="0"/>
-              <a:t>“As a Roman Bookkeeper, I want to add Roman numbers because doing it manually is too tedious”</a:t>
-            </a:r>
-          </a:p>
-          <a:p>
-            <a:pPr lvl="2"/>
-            <a:r>
-              <a:rPr lang="en-IE" dirty="0"/>
-              <a:t>As a User, I want to be able to access  the System via a web based GUI so that I can add two roman numerals</a:t>
-            </a:r>
-          </a:p>
-          <a:p>
-            <a:pPr lvl="2"/>
-            <a:r>
-              <a:rPr lang="en-IE" dirty="0"/>
-              <a:t>As a User, I want the GUI to display the correct result when two valid Roman Numerals have been entered as input</a:t>
-            </a:r>
-          </a:p>
-          <a:p>
-            <a:pPr lvl="2"/>
-            <a:r>
-              <a:rPr lang="en-IE" dirty="0"/>
-              <a:t>As a User, I want the GUI to display an error message where an invalid Roman numeral string has been entered as input</a:t>
-            </a:r>
-          </a:p>
-          <a:p>
-            <a:pPr marL="342900" lvl="2" indent="-342900"/>
-            <a:endParaRPr lang="en-IE" sz="1800" b="1" dirty="0"/>
-          </a:p>
-          <a:p>
-            <a:pPr marL="342900" lvl="2" indent="-342900"/>
-            <a:r>
-              <a:rPr lang="en-IE" sz="1800" b="1" dirty="0"/>
-              <a:t>Product Owner requirements</a:t>
-            </a:r>
-          </a:p>
-          <a:p>
-            <a:pPr marL="800100" lvl="3" indent="-342900"/>
-            <a:r>
-              <a:rPr lang="en-IE" sz="1600" dirty="0"/>
-              <a:t>All presented code should be working and clean</a:t>
-            </a:r>
-          </a:p>
-          <a:p>
-            <a:pPr marL="800100" lvl="3" indent="-342900"/>
-            <a:r>
-              <a:rPr lang="en-IE" sz="1600" dirty="0"/>
-              <a:t>All code should be well tested and testing occurs on the correct level of abstraction</a:t>
-            </a:r>
-          </a:p>
-          <a:p>
-            <a:pPr marL="800100" lvl="3" indent="-342900"/>
-            <a:r>
-              <a:rPr lang="en-IE" sz="1600" dirty="0"/>
-              <a:t>The project and code design should  be Simple and easy to read.</a:t>
-            </a:r>
-          </a:p>
-          <a:p>
-            <a:pPr marL="800100" lvl="3" indent="-342900"/>
-            <a:r>
-              <a:rPr lang="en-IE" sz="1600" dirty="0"/>
-              <a:t>The project will eventually be transformed into a Microservice using Docker</a:t>
-            </a:r>
-          </a:p>
-          <a:p>
-            <a:pPr marL="800100" lvl="3" indent="-342900"/>
-            <a:r>
-              <a:rPr lang="en-IE" sz="1600" dirty="0"/>
-              <a:t>Sprint 0 will focus on implementing the addition functionality end-to-end</a:t>
-            </a:r>
-          </a:p>
-          <a:p>
-            <a:pPr marL="800100" lvl="3" indent="-342900"/>
-            <a:endParaRPr lang="en-IE" sz="1600" dirty="0"/>
-          </a:p>
-          <a:p>
-            <a:pPr marL="914400" lvl="2" indent="0">
-              <a:buNone/>
-            </a:pPr>
-            <a:endParaRPr lang="en-IE" dirty="0"/>
-          </a:p>
-          <a:p>
-            <a:pPr lvl="2"/>
-            <a:endParaRPr lang="en-IE" dirty="0"/>
-          </a:p>
-          <a:p>
-            <a:pPr marL="914400" lvl="2" indent="0">
-              <a:buNone/>
-            </a:pPr>
-            <a:endParaRPr lang="en-IE" dirty="0"/>
+              <a:t>Class Diagram</a:t>
+            </a:r>
           </a:p>
         </p:txBody>
       </p:sp>
@@ -9047,6 +8924,36 @@
           </a:p>
         </p:txBody>
       </p:sp>
+      <p:pic>
+        <p:nvPicPr>
+          <p:cNvPr id="7" name="Picture 6">
+            <a:extLst>
+              <a:ext uri="{FF2B5EF4-FFF2-40B4-BE49-F238E27FC236}">
+                <a16:creationId xmlns:a16="http://schemas.microsoft.com/office/drawing/2014/main" id="{12E47B1F-E541-4106-8D03-B4947072D9D6}"/>
+              </a:ext>
+            </a:extLst>
+          </p:cNvPr>
+          <p:cNvPicPr>
+            <a:picLocks noChangeAspect="1"/>
+          </p:cNvPicPr>
+          <p:nvPr/>
+        </p:nvPicPr>
+        <p:blipFill>
+          <a:blip r:embed="rId3"/>
+          <a:stretch>
+            <a:fillRect/>
+          </a:stretch>
+        </p:blipFill>
+        <p:spPr>
+          <a:xfrm>
+            <a:off x="867428" y="1352809"/>
+            <a:ext cx="10457143" cy="4152381"/>
+          </a:xfrm>
+          <a:prstGeom prst="rect">
+            <a:avLst/>
+          </a:prstGeom>
+        </p:spPr>
+      </p:pic>
     </p:spTree>
     <p:extLst>
       <p:ext uri="{BB962C8B-B14F-4D97-AF65-F5344CB8AC3E}">

</xml_diff>